<commit_message>
Permutation & Combination by My Lesson YT Channel is Good
</commit_message>
<xml_diff>
--- a/Aptitude/Permutation & Combination/Permutation & Combination.pptx
+++ b/Aptitude/Permutation & Combination/Permutation & Combination.pptx
@@ -6,9 +6,18 @@
   </p:sldMasterIdLst>
   <p:sldIdLst>
     <p:sldId id="256" r:id="rId2"/>
-    <p:sldId id="257" r:id="rId3"/>
-    <p:sldId id="260" r:id="rId4"/>
-    <p:sldId id="259" r:id="rId5"/>
+    <p:sldId id="269" r:id="rId3"/>
+    <p:sldId id="257" r:id="rId4"/>
+    <p:sldId id="260" r:id="rId5"/>
+    <p:sldId id="259" r:id="rId6"/>
+    <p:sldId id="261" r:id="rId7"/>
+    <p:sldId id="262" r:id="rId8"/>
+    <p:sldId id="263" r:id="rId9"/>
+    <p:sldId id="264" r:id="rId10"/>
+    <p:sldId id="265" r:id="rId11"/>
+    <p:sldId id="266" r:id="rId12"/>
+    <p:sldId id="267" r:id="rId13"/>
+    <p:sldId id="268" r:id="rId14"/>
   </p:sldIdLst>
   <p:sldSz cx="12192000" cy="6858000"/>
   <p:notesSz cx="6858000" cy="9144000"/>
@@ -264,7 +273,7 @@
           <a:p>
             <a:fld id="{0722D220-2F1E-4719-8D66-0F683A37CE96}" type="datetimeFigureOut">
               <a:rPr lang="en-IN" smtClean="0"/>
-              <a:t>08-10-2025</a:t>
+              <a:t>26-10-2025</a:t>
             </a:fld>
             <a:endParaRPr lang="en-IN"/>
           </a:p>
@@ -464,7 +473,7 @@
           <a:p>
             <a:fld id="{0722D220-2F1E-4719-8D66-0F683A37CE96}" type="datetimeFigureOut">
               <a:rPr lang="en-IN" smtClean="0"/>
-              <a:t>08-10-2025</a:t>
+              <a:t>26-10-2025</a:t>
             </a:fld>
             <a:endParaRPr lang="en-IN"/>
           </a:p>
@@ -674,7 +683,7 @@
           <a:p>
             <a:fld id="{0722D220-2F1E-4719-8D66-0F683A37CE96}" type="datetimeFigureOut">
               <a:rPr lang="en-IN" smtClean="0"/>
-              <a:t>08-10-2025</a:t>
+              <a:t>26-10-2025</a:t>
             </a:fld>
             <a:endParaRPr lang="en-IN"/>
           </a:p>
@@ -874,7 +883,7 @@
           <a:p>
             <a:fld id="{0722D220-2F1E-4719-8D66-0F683A37CE96}" type="datetimeFigureOut">
               <a:rPr lang="en-IN" smtClean="0"/>
-              <a:t>08-10-2025</a:t>
+              <a:t>26-10-2025</a:t>
             </a:fld>
             <a:endParaRPr lang="en-IN"/>
           </a:p>
@@ -1150,7 +1159,7 @@
           <a:p>
             <a:fld id="{0722D220-2F1E-4719-8D66-0F683A37CE96}" type="datetimeFigureOut">
               <a:rPr lang="en-IN" smtClean="0"/>
-              <a:t>08-10-2025</a:t>
+              <a:t>26-10-2025</a:t>
             </a:fld>
             <a:endParaRPr lang="en-IN"/>
           </a:p>
@@ -1418,7 +1427,7 @@
           <a:p>
             <a:fld id="{0722D220-2F1E-4719-8D66-0F683A37CE96}" type="datetimeFigureOut">
               <a:rPr lang="en-IN" smtClean="0"/>
-              <a:t>08-10-2025</a:t>
+              <a:t>26-10-2025</a:t>
             </a:fld>
             <a:endParaRPr lang="en-IN"/>
           </a:p>
@@ -1833,7 +1842,7 @@
           <a:p>
             <a:fld id="{0722D220-2F1E-4719-8D66-0F683A37CE96}" type="datetimeFigureOut">
               <a:rPr lang="en-IN" smtClean="0"/>
-              <a:t>08-10-2025</a:t>
+              <a:t>26-10-2025</a:t>
             </a:fld>
             <a:endParaRPr lang="en-IN"/>
           </a:p>
@@ -1975,7 +1984,7 @@
           <a:p>
             <a:fld id="{0722D220-2F1E-4719-8D66-0F683A37CE96}" type="datetimeFigureOut">
               <a:rPr lang="en-IN" smtClean="0"/>
-              <a:t>08-10-2025</a:t>
+              <a:t>26-10-2025</a:t>
             </a:fld>
             <a:endParaRPr lang="en-IN"/>
           </a:p>
@@ -2088,7 +2097,7 @@
           <a:p>
             <a:fld id="{0722D220-2F1E-4719-8D66-0F683A37CE96}" type="datetimeFigureOut">
               <a:rPr lang="en-IN" smtClean="0"/>
-              <a:t>08-10-2025</a:t>
+              <a:t>26-10-2025</a:t>
             </a:fld>
             <a:endParaRPr lang="en-IN"/>
           </a:p>
@@ -2401,7 +2410,7 @@
           <a:p>
             <a:fld id="{0722D220-2F1E-4719-8D66-0F683A37CE96}" type="datetimeFigureOut">
               <a:rPr lang="en-IN" smtClean="0"/>
-              <a:t>08-10-2025</a:t>
+              <a:t>26-10-2025</a:t>
             </a:fld>
             <a:endParaRPr lang="en-IN"/>
           </a:p>
@@ -2690,7 +2699,7 @@
           <a:p>
             <a:fld id="{0722D220-2F1E-4719-8D66-0F683A37CE96}" type="datetimeFigureOut">
               <a:rPr lang="en-IN" smtClean="0"/>
-              <a:t>08-10-2025</a:t>
+              <a:t>26-10-2025</a:t>
             </a:fld>
             <a:endParaRPr lang="en-IN"/>
           </a:p>
@@ -2933,7 +2942,7 @@
           <a:p>
             <a:fld id="{0722D220-2F1E-4719-8D66-0F683A37CE96}" type="datetimeFigureOut">
               <a:rPr lang="en-IN" smtClean="0"/>
-              <a:t>08-10-2025</a:t>
+              <a:t>26-10-2025</a:t>
             </a:fld>
             <a:endParaRPr lang="en-IN"/>
           </a:p>
@@ -3413,7 +3422,539 @@
 </p:sld>
 </file>
 
+<file path=ppt/slides/slide10.xml><?xml version="1.0" encoding="utf-8"?>
+<p:sld xmlns:a="http://schemas.openxmlformats.org/drawingml/2006/main" xmlns:r="http://schemas.openxmlformats.org/officeDocument/2006/relationships" xmlns:p="http://schemas.openxmlformats.org/presentationml/2006/main">
+  <p:cSld>
+    <p:spTree>
+      <p:nvGrpSpPr>
+        <p:cNvPr id="1" name=""/>
+        <p:cNvGrpSpPr/>
+        <p:nvPr/>
+      </p:nvGrpSpPr>
+      <p:grpSpPr>
+        <a:xfrm>
+          <a:off x="0" y="0"/>
+          <a:ext cx="0" cy="0"/>
+          <a:chOff x="0" y="0"/>
+          <a:chExt cx="0" cy="0"/>
+        </a:xfrm>
+      </p:grpSpPr>
+      <p:sp>
+        <p:nvSpPr>
+          <p:cNvPr id="2" name="Title 1">
+            <a:extLst>
+              <a:ext uri="{FF2B5EF4-FFF2-40B4-BE49-F238E27FC236}">
+                <a16:creationId xmlns:a16="http://schemas.microsoft.com/office/drawing/2014/main" id="{FDC9916B-4285-4E41-9649-1C84848A25A4}"/>
+              </a:ext>
+            </a:extLst>
+          </p:cNvPr>
+          <p:cNvSpPr>
+            <a:spLocks noGrp="1"/>
+          </p:cNvSpPr>
+          <p:nvPr>
+            <p:ph type="title"/>
+          </p:nvPr>
+        </p:nvSpPr>
+        <p:spPr/>
+        <p:txBody>
+          <a:bodyPr/>
+          <a:lstStyle/>
+          <a:p>
+            <a:r>
+              <a:rPr lang="en-IN" dirty="0"/>
+              <a:t>Ordered + without Repetition</a:t>
+            </a:r>
+          </a:p>
+        </p:txBody>
+      </p:sp>
+      <p:pic>
+        <p:nvPicPr>
+          <p:cNvPr id="7" name="Content Placeholder 6">
+            <a:extLst>
+              <a:ext uri="{FF2B5EF4-FFF2-40B4-BE49-F238E27FC236}">
+                <a16:creationId xmlns:a16="http://schemas.microsoft.com/office/drawing/2014/main" id="{7D1778F3-749B-495E-99D2-5A63B272CC20}"/>
+              </a:ext>
+            </a:extLst>
+          </p:cNvPr>
+          <p:cNvPicPr>
+            <a:picLocks noGrp="1" noChangeAspect="1"/>
+          </p:cNvPicPr>
+          <p:nvPr>
+            <p:ph idx="1"/>
+          </p:nvPr>
+        </p:nvPicPr>
+        <p:blipFill>
+          <a:blip r:embed="rId2"/>
+          <a:stretch>
+            <a:fillRect/>
+          </a:stretch>
+        </p:blipFill>
+        <p:spPr>
+          <a:xfrm>
+            <a:off x="838200" y="1513633"/>
+            <a:ext cx="9058811" cy="4509156"/>
+          </a:xfrm>
+        </p:spPr>
+      </p:pic>
+    </p:spTree>
+    <p:extLst>
+      <p:ext uri="{BB962C8B-B14F-4D97-AF65-F5344CB8AC3E}">
+        <p14:creationId xmlns:p14="http://schemas.microsoft.com/office/powerpoint/2010/main" val="3784396230"/>
+      </p:ext>
+    </p:extLst>
+  </p:cSld>
+  <p:clrMapOvr>
+    <a:masterClrMapping/>
+  </p:clrMapOvr>
+</p:sld>
+</file>
+
+<file path=ppt/slides/slide11.xml><?xml version="1.0" encoding="utf-8"?>
+<p:sld xmlns:a="http://schemas.openxmlformats.org/drawingml/2006/main" xmlns:r="http://schemas.openxmlformats.org/officeDocument/2006/relationships" xmlns:p="http://schemas.openxmlformats.org/presentationml/2006/main">
+  <p:cSld>
+    <p:spTree>
+      <p:nvGrpSpPr>
+        <p:cNvPr id="1" name=""/>
+        <p:cNvGrpSpPr/>
+        <p:nvPr/>
+      </p:nvGrpSpPr>
+      <p:grpSpPr>
+        <a:xfrm>
+          <a:off x="0" y="0"/>
+          <a:ext cx="0" cy="0"/>
+          <a:chOff x="0" y="0"/>
+          <a:chExt cx="0" cy="0"/>
+        </a:xfrm>
+      </p:grpSpPr>
+      <p:sp>
+        <p:nvSpPr>
+          <p:cNvPr id="2" name="Title 1">
+            <a:extLst>
+              <a:ext uri="{FF2B5EF4-FFF2-40B4-BE49-F238E27FC236}">
+                <a16:creationId xmlns:a16="http://schemas.microsoft.com/office/drawing/2014/main" id="{2977C79C-A03A-4CCF-9BE1-E2A0C600198D}"/>
+              </a:ext>
+            </a:extLst>
+          </p:cNvPr>
+          <p:cNvSpPr>
+            <a:spLocks noGrp="1"/>
+          </p:cNvSpPr>
+          <p:nvPr>
+            <p:ph type="title"/>
+          </p:nvPr>
+        </p:nvSpPr>
+        <p:spPr/>
+        <p:txBody>
+          <a:bodyPr/>
+          <a:lstStyle/>
+          <a:p>
+            <a:r>
+              <a:rPr lang="en-IN" dirty="0"/>
+              <a:t>Ordered + With Repetition</a:t>
+            </a:r>
+          </a:p>
+        </p:txBody>
+      </p:sp>
+      <p:pic>
+        <p:nvPicPr>
+          <p:cNvPr id="5" name="Content Placeholder 4">
+            <a:extLst>
+              <a:ext uri="{FF2B5EF4-FFF2-40B4-BE49-F238E27FC236}">
+                <a16:creationId xmlns:a16="http://schemas.microsoft.com/office/drawing/2014/main" id="{5F29B9D6-3885-43B8-BA7E-F82760CA9271}"/>
+              </a:ext>
+            </a:extLst>
+          </p:cNvPr>
+          <p:cNvPicPr>
+            <a:picLocks noGrp="1" noChangeAspect="1"/>
+          </p:cNvPicPr>
+          <p:nvPr>
+            <p:ph idx="1"/>
+          </p:nvPr>
+        </p:nvPicPr>
+        <p:blipFill>
+          <a:blip r:embed="rId2"/>
+          <a:stretch>
+            <a:fillRect/>
+          </a:stretch>
+        </p:blipFill>
+        <p:spPr>
+          <a:xfrm>
+            <a:off x="724501" y="1481192"/>
+            <a:ext cx="7497778" cy="3659632"/>
+          </a:xfrm>
+        </p:spPr>
+      </p:pic>
+      <p:pic>
+        <p:nvPicPr>
+          <p:cNvPr id="9" name="Picture 8">
+            <a:extLst>
+              <a:ext uri="{FF2B5EF4-FFF2-40B4-BE49-F238E27FC236}">
+                <a16:creationId xmlns:a16="http://schemas.microsoft.com/office/drawing/2014/main" id="{5ECE487C-1BD0-4026-8143-238E4E784BE9}"/>
+              </a:ext>
+            </a:extLst>
+          </p:cNvPr>
+          <p:cNvPicPr>
+            <a:picLocks noChangeAspect="1"/>
+          </p:cNvPicPr>
+          <p:nvPr/>
+        </p:nvPicPr>
+        <p:blipFill>
+          <a:blip r:embed="rId3"/>
+          <a:stretch>
+            <a:fillRect/>
+          </a:stretch>
+        </p:blipFill>
+        <p:spPr>
+          <a:xfrm>
+            <a:off x="838200" y="5376808"/>
+            <a:ext cx="7986452" cy="678239"/>
+          </a:xfrm>
+          <a:prstGeom prst="rect">
+            <a:avLst/>
+          </a:prstGeom>
+        </p:spPr>
+      </p:pic>
+    </p:spTree>
+    <p:extLst>
+      <p:ext uri="{BB962C8B-B14F-4D97-AF65-F5344CB8AC3E}">
+        <p14:creationId xmlns:p14="http://schemas.microsoft.com/office/powerpoint/2010/main" val="2846210061"/>
+      </p:ext>
+    </p:extLst>
+  </p:cSld>
+  <p:clrMapOvr>
+    <a:masterClrMapping/>
+  </p:clrMapOvr>
+</p:sld>
+</file>
+
+<file path=ppt/slides/slide12.xml><?xml version="1.0" encoding="utf-8"?>
+<p:sld xmlns:a="http://schemas.openxmlformats.org/drawingml/2006/main" xmlns:r="http://schemas.openxmlformats.org/officeDocument/2006/relationships" xmlns:p="http://schemas.openxmlformats.org/presentationml/2006/main">
+  <p:cSld>
+    <p:spTree>
+      <p:nvGrpSpPr>
+        <p:cNvPr id="1" name=""/>
+        <p:cNvGrpSpPr/>
+        <p:nvPr/>
+      </p:nvGrpSpPr>
+      <p:grpSpPr>
+        <a:xfrm>
+          <a:off x="0" y="0"/>
+          <a:ext cx="0" cy="0"/>
+          <a:chOff x="0" y="0"/>
+          <a:chExt cx="0" cy="0"/>
+        </a:xfrm>
+      </p:grpSpPr>
+      <p:sp>
+        <p:nvSpPr>
+          <p:cNvPr id="2" name="Title 1">
+            <a:extLst>
+              <a:ext uri="{FF2B5EF4-FFF2-40B4-BE49-F238E27FC236}">
+                <a16:creationId xmlns:a16="http://schemas.microsoft.com/office/drawing/2014/main" id="{F382C0F9-DB72-4892-9C7D-E34BE5E83667}"/>
+              </a:ext>
+            </a:extLst>
+          </p:cNvPr>
+          <p:cNvSpPr>
+            <a:spLocks noGrp="1"/>
+          </p:cNvSpPr>
+          <p:nvPr>
+            <p:ph type="title"/>
+          </p:nvPr>
+        </p:nvSpPr>
+        <p:spPr/>
+        <p:txBody>
+          <a:bodyPr/>
+          <a:lstStyle/>
+          <a:p>
+            <a:endParaRPr lang="en-IN"/>
+          </a:p>
+        </p:txBody>
+      </p:sp>
+      <p:pic>
+        <p:nvPicPr>
+          <p:cNvPr id="11" name="Content Placeholder 10">
+            <a:extLst>
+              <a:ext uri="{FF2B5EF4-FFF2-40B4-BE49-F238E27FC236}">
+                <a16:creationId xmlns:a16="http://schemas.microsoft.com/office/drawing/2014/main" id="{B89C9711-EBBB-405C-976C-4D28A62F46C1}"/>
+              </a:ext>
+            </a:extLst>
+          </p:cNvPr>
+          <p:cNvPicPr>
+            <a:picLocks noGrp="1" noChangeAspect="1"/>
+          </p:cNvPicPr>
+          <p:nvPr>
+            <p:ph idx="1"/>
+          </p:nvPr>
+        </p:nvPicPr>
+        <p:blipFill>
+          <a:blip r:embed="rId2"/>
+          <a:stretch>
+            <a:fillRect/>
+          </a:stretch>
+        </p:blipFill>
+        <p:spPr>
+          <a:xfrm>
+            <a:off x="6096000" y="293492"/>
+            <a:ext cx="5166808" cy="3604572"/>
+          </a:xfrm>
+        </p:spPr>
+      </p:pic>
+      <p:pic>
+        <p:nvPicPr>
+          <p:cNvPr id="13" name="Picture 12">
+            <a:extLst>
+              <a:ext uri="{FF2B5EF4-FFF2-40B4-BE49-F238E27FC236}">
+                <a16:creationId xmlns:a16="http://schemas.microsoft.com/office/drawing/2014/main" id="{334383A1-A3A2-4EB9-86F7-53ACAF42CE9B}"/>
+              </a:ext>
+            </a:extLst>
+          </p:cNvPr>
+          <p:cNvPicPr>
+            <a:picLocks noChangeAspect="1"/>
+          </p:cNvPicPr>
+          <p:nvPr/>
+        </p:nvPicPr>
+        <p:blipFill>
+          <a:blip r:embed="rId3"/>
+          <a:stretch>
+            <a:fillRect/>
+          </a:stretch>
+        </p:blipFill>
+        <p:spPr>
+          <a:xfrm>
+            <a:off x="554243" y="365125"/>
+            <a:ext cx="5243014" cy="2362405"/>
+          </a:xfrm>
+          <a:prstGeom prst="rect">
+            <a:avLst/>
+          </a:prstGeom>
+        </p:spPr>
+      </p:pic>
+    </p:spTree>
+    <p:extLst>
+      <p:ext uri="{BB962C8B-B14F-4D97-AF65-F5344CB8AC3E}">
+        <p14:creationId xmlns:p14="http://schemas.microsoft.com/office/powerpoint/2010/main" val="2521203827"/>
+      </p:ext>
+    </p:extLst>
+  </p:cSld>
+  <p:clrMapOvr>
+    <a:masterClrMapping/>
+  </p:clrMapOvr>
+</p:sld>
+</file>
+
+<file path=ppt/slides/slide13.xml><?xml version="1.0" encoding="utf-8"?>
+<p:sld xmlns:a="http://schemas.openxmlformats.org/drawingml/2006/main" xmlns:r="http://schemas.openxmlformats.org/officeDocument/2006/relationships" xmlns:p="http://schemas.openxmlformats.org/presentationml/2006/main">
+  <p:cSld>
+    <p:spTree>
+      <p:nvGrpSpPr>
+        <p:cNvPr id="1" name=""/>
+        <p:cNvGrpSpPr/>
+        <p:nvPr/>
+      </p:nvGrpSpPr>
+      <p:grpSpPr>
+        <a:xfrm>
+          <a:off x="0" y="0"/>
+          <a:ext cx="0" cy="0"/>
+          <a:chOff x="0" y="0"/>
+          <a:chExt cx="0" cy="0"/>
+        </a:xfrm>
+      </p:grpSpPr>
+      <p:pic>
+        <p:nvPicPr>
+          <p:cNvPr id="5" name="Content Placeholder 4">
+            <a:extLst>
+              <a:ext uri="{FF2B5EF4-FFF2-40B4-BE49-F238E27FC236}">
+                <a16:creationId xmlns:a16="http://schemas.microsoft.com/office/drawing/2014/main" id="{F6FCCF79-4A41-4E6E-A4E3-A7829132008A}"/>
+              </a:ext>
+            </a:extLst>
+          </p:cNvPr>
+          <p:cNvPicPr>
+            <a:picLocks noGrp="1" noChangeAspect="1"/>
+          </p:cNvPicPr>
+          <p:nvPr>
+            <p:ph idx="1"/>
+          </p:nvPr>
+        </p:nvPicPr>
+        <p:blipFill>
+          <a:blip r:embed="rId2"/>
+          <a:stretch>
+            <a:fillRect/>
+          </a:stretch>
+        </p:blipFill>
+        <p:spPr>
+          <a:xfrm>
+            <a:off x="273424" y="1001156"/>
+            <a:ext cx="7315834" cy="2857748"/>
+          </a:xfrm>
+        </p:spPr>
+      </p:pic>
+      <p:pic>
+        <p:nvPicPr>
+          <p:cNvPr id="7" name="Picture 6">
+            <a:extLst>
+              <a:ext uri="{FF2B5EF4-FFF2-40B4-BE49-F238E27FC236}">
+                <a16:creationId xmlns:a16="http://schemas.microsoft.com/office/drawing/2014/main" id="{1FD0F92A-9CAC-41FD-AD5A-F27F33ED9196}"/>
+              </a:ext>
+            </a:extLst>
+          </p:cNvPr>
+          <p:cNvPicPr>
+            <a:picLocks noChangeAspect="1"/>
+          </p:cNvPicPr>
+          <p:nvPr/>
+        </p:nvPicPr>
+        <p:blipFill>
+          <a:blip r:embed="rId3"/>
+          <a:stretch>
+            <a:fillRect/>
+          </a:stretch>
+        </p:blipFill>
+        <p:spPr>
+          <a:xfrm>
+            <a:off x="838200" y="298725"/>
+            <a:ext cx="10348857" cy="541067"/>
+          </a:xfrm>
+          <a:prstGeom prst="rect">
+            <a:avLst/>
+          </a:prstGeom>
+        </p:spPr>
+      </p:pic>
+      <p:pic>
+        <p:nvPicPr>
+          <p:cNvPr id="11" name="Picture 10">
+            <a:extLst>
+              <a:ext uri="{FF2B5EF4-FFF2-40B4-BE49-F238E27FC236}">
+                <a16:creationId xmlns:a16="http://schemas.microsoft.com/office/drawing/2014/main" id="{00B0B08A-F0F4-455B-B87B-E3D78B091016}"/>
+              </a:ext>
+            </a:extLst>
+          </p:cNvPr>
+          <p:cNvPicPr>
+            <a:picLocks noChangeAspect="1"/>
+          </p:cNvPicPr>
+          <p:nvPr/>
+        </p:nvPicPr>
+        <p:blipFill>
+          <a:blip r:embed="rId4"/>
+          <a:stretch>
+            <a:fillRect/>
+          </a:stretch>
+        </p:blipFill>
+        <p:spPr>
+          <a:xfrm>
+            <a:off x="7772474" y="1001156"/>
+            <a:ext cx="4320914" cy="5479255"/>
+          </a:xfrm>
+          <a:prstGeom prst="rect">
+            <a:avLst/>
+          </a:prstGeom>
+        </p:spPr>
+      </p:pic>
+      <p:pic>
+        <p:nvPicPr>
+          <p:cNvPr id="12" name="Picture 11">
+            <a:extLst>
+              <a:ext uri="{FF2B5EF4-FFF2-40B4-BE49-F238E27FC236}">
+                <a16:creationId xmlns:a16="http://schemas.microsoft.com/office/drawing/2014/main" id="{4D59DBF5-B756-44A6-A295-31068B15BB5D}"/>
+              </a:ext>
+            </a:extLst>
+          </p:cNvPr>
+          <p:cNvPicPr>
+            <a:picLocks noChangeAspect="1"/>
+          </p:cNvPicPr>
+          <p:nvPr/>
+        </p:nvPicPr>
+        <p:blipFill>
+          <a:blip r:embed="rId3"/>
+          <a:stretch>
+            <a:fillRect/>
+          </a:stretch>
+        </p:blipFill>
+        <p:spPr>
+          <a:xfrm>
+            <a:off x="524435" y="298725"/>
+            <a:ext cx="10348857" cy="541067"/>
+          </a:xfrm>
+          <a:prstGeom prst="rect">
+            <a:avLst/>
+          </a:prstGeom>
+        </p:spPr>
+      </p:pic>
+    </p:spTree>
+    <p:extLst>
+      <p:ext uri="{BB962C8B-B14F-4D97-AF65-F5344CB8AC3E}">
+        <p14:creationId xmlns:p14="http://schemas.microsoft.com/office/powerpoint/2010/main" val="335212623"/>
+      </p:ext>
+    </p:extLst>
+  </p:cSld>
+  <p:clrMapOvr>
+    <a:masterClrMapping/>
+  </p:clrMapOvr>
+</p:sld>
+</file>
+
 <file path=ppt/slides/slide2.xml><?xml version="1.0" encoding="utf-8"?>
+<p:sld xmlns:a="http://schemas.openxmlformats.org/drawingml/2006/main" xmlns:r="http://schemas.openxmlformats.org/officeDocument/2006/relationships" xmlns:p="http://schemas.openxmlformats.org/presentationml/2006/main">
+  <p:cSld>
+    <p:spTree>
+      <p:nvGrpSpPr>
+        <p:cNvPr id="1" name=""/>
+        <p:cNvGrpSpPr/>
+        <p:nvPr/>
+      </p:nvGrpSpPr>
+      <p:grpSpPr>
+        <a:xfrm>
+          <a:off x="0" y="0"/>
+          <a:ext cx="0" cy="0"/>
+          <a:chOff x="0" y="0"/>
+          <a:chExt cx="0" cy="0"/>
+        </a:xfrm>
+      </p:grpSpPr>
+      <p:pic>
+        <p:nvPicPr>
+          <p:cNvPr id="5" name="Content Placeholder 4">
+            <a:extLst>
+              <a:ext uri="{FF2B5EF4-FFF2-40B4-BE49-F238E27FC236}">
+                <a16:creationId xmlns:a16="http://schemas.microsoft.com/office/drawing/2014/main" id="{0385D609-64DB-42DF-BDB4-B5206C3D203F}"/>
+              </a:ext>
+            </a:extLst>
+          </p:cNvPr>
+          <p:cNvPicPr>
+            <a:picLocks noGrp="1" noChangeAspect="1"/>
+          </p:cNvPicPr>
+          <p:nvPr>
+            <p:ph idx="1"/>
+          </p:nvPr>
+        </p:nvPicPr>
+        <p:blipFill>
+          <a:blip r:embed="rId2">
+            <a:extLst>
+              <a:ext uri="{28A0092B-C50C-407E-A947-70E740481C1C}">
+                <a14:useLocalDpi xmlns:a14="http://schemas.microsoft.com/office/drawing/2010/main" val="0"/>
+              </a:ext>
+            </a:extLst>
+          </a:blip>
+          <a:stretch>
+            <a:fillRect/>
+          </a:stretch>
+        </p:blipFill>
+        <p:spPr>
+          <a:xfrm>
+            <a:off x="1846318" y="215262"/>
+            <a:ext cx="8499365" cy="6370794"/>
+          </a:xfrm>
+        </p:spPr>
+      </p:pic>
+    </p:spTree>
+    <p:extLst>
+      <p:ext uri="{BB962C8B-B14F-4D97-AF65-F5344CB8AC3E}">
+        <p14:creationId xmlns:p14="http://schemas.microsoft.com/office/powerpoint/2010/main" val="948800543"/>
+      </p:ext>
+    </p:extLst>
+  </p:cSld>
+  <p:clrMapOvr>
+    <a:masterClrMapping/>
+  </p:clrMapOvr>
+</p:sld>
+</file>
+
+<file path=ppt/slides/slide3.xml><?xml version="1.0" encoding="utf-8"?>
 <p:sld xmlns:a="http://schemas.openxmlformats.org/drawingml/2006/main" xmlns:r="http://schemas.openxmlformats.org/officeDocument/2006/relationships" xmlns:p="http://schemas.openxmlformats.org/presentationml/2006/main">
   <p:cSld>
     <p:spTree>
@@ -3550,7 +4091,7 @@
 </p:sld>
 </file>
 
-<file path=ppt/slides/slide3.xml><?xml version="1.0" encoding="utf-8"?>
+<file path=ppt/slides/slide4.xml><?xml version="1.0" encoding="utf-8"?>
 <p:sld xmlns:a="http://schemas.openxmlformats.org/drawingml/2006/main" xmlns:r="http://schemas.openxmlformats.org/officeDocument/2006/relationships" xmlns:p="http://schemas.openxmlformats.org/presentationml/2006/main">
   <p:cSld>
     <p:spTree>
@@ -3684,7 +4225,7 @@
 </p:sld>
 </file>
 
-<file path=ppt/slides/slide4.xml><?xml version="1.0" encoding="utf-8"?>
+<file path=ppt/slides/slide5.xml><?xml version="1.0" encoding="utf-8"?>
 <p:sld xmlns:a="http://schemas.openxmlformats.org/drawingml/2006/main" xmlns:r="http://schemas.openxmlformats.org/officeDocument/2006/relationships" xmlns:p="http://schemas.openxmlformats.org/presentationml/2006/main">
   <p:cSld>
     <p:spTree>
@@ -3795,6 +4336,508 @@
     <p:extLst>
       <p:ext uri="{BB962C8B-B14F-4D97-AF65-F5344CB8AC3E}">
         <p14:creationId xmlns:p14="http://schemas.microsoft.com/office/powerpoint/2010/main" val="4013761469"/>
+      </p:ext>
+    </p:extLst>
+  </p:cSld>
+  <p:clrMapOvr>
+    <a:masterClrMapping/>
+  </p:clrMapOvr>
+</p:sld>
+</file>
+
+<file path=ppt/slides/slide6.xml><?xml version="1.0" encoding="utf-8"?>
+<p:sld xmlns:a="http://schemas.openxmlformats.org/drawingml/2006/main" xmlns:r="http://schemas.openxmlformats.org/officeDocument/2006/relationships" xmlns:p="http://schemas.openxmlformats.org/presentationml/2006/main">
+  <p:cSld>
+    <p:spTree>
+      <p:nvGrpSpPr>
+        <p:cNvPr id="1" name=""/>
+        <p:cNvGrpSpPr/>
+        <p:nvPr/>
+      </p:nvGrpSpPr>
+      <p:grpSpPr>
+        <a:xfrm>
+          <a:off x="0" y="0"/>
+          <a:ext cx="0" cy="0"/>
+          <a:chOff x="0" y="0"/>
+          <a:chExt cx="0" cy="0"/>
+        </a:xfrm>
+      </p:grpSpPr>
+      <p:sp>
+        <p:nvSpPr>
+          <p:cNvPr id="2" name="Title 1">
+            <a:extLst>
+              <a:ext uri="{FF2B5EF4-FFF2-40B4-BE49-F238E27FC236}">
+                <a16:creationId xmlns:a16="http://schemas.microsoft.com/office/drawing/2014/main" id="{4F3E2509-6882-4764-A6CA-7BEEEF7D48B6}"/>
+              </a:ext>
+            </a:extLst>
+          </p:cNvPr>
+          <p:cNvSpPr>
+            <a:spLocks noGrp="1"/>
+          </p:cNvSpPr>
+          <p:nvPr>
+            <p:ph type="title"/>
+          </p:nvPr>
+        </p:nvSpPr>
+        <p:spPr/>
+        <p:txBody>
+          <a:bodyPr/>
+          <a:lstStyle/>
+          <a:p>
+            <a:endParaRPr lang="en-IN"/>
+          </a:p>
+        </p:txBody>
+      </p:sp>
+      <p:pic>
+        <p:nvPicPr>
+          <p:cNvPr id="5" name="Content Placeholder 4">
+            <a:extLst>
+              <a:ext uri="{FF2B5EF4-FFF2-40B4-BE49-F238E27FC236}">
+                <a16:creationId xmlns:a16="http://schemas.microsoft.com/office/drawing/2014/main" id="{7E3201CA-4AEA-4FC9-8928-1B751EDE423D}"/>
+              </a:ext>
+            </a:extLst>
+          </p:cNvPr>
+          <p:cNvPicPr>
+            <a:picLocks noGrp="1" noChangeAspect="1"/>
+          </p:cNvPicPr>
+          <p:nvPr>
+            <p:ph idx="1"/>
+          </p:nvPr>
+        </p:nvPicPr>
+        <p:blipFill>
+          <a:blip r:embed="rId2"/>
+          <a:stretch>
+            <a:fillRect/>
+          </a:stretch>
+        </p:blipFill>
+        <p:spPr>
+          <a:xfrm>
+            <a:off x="416276" y="197331"/>
+            <a:ext cx="11359448" cy="6370794"/>
+          </a:xfrm>
+        </p:spPr>
+      </p:pic>
+    </p:spTree>
+    <p:extLst>
+      <p:ext uri="{BB962C8B-B14F-4D97-AF65-F5344CB8AC3E}">
+        <p14:creationId xmlns:p14="http://schemas.microsoft.com/office/powerpoint/2010/main" val="3064286777"/>
+      </p:ext>
+    </p:extLst>
+  </p:cSld>
+  <p:clrMapOvr>
+    <a:masterClrMapping/>
+  </p:clrMapOvr>
+</p:sld>
+</file>
+
+<file path=ppt/slides/slide7.xml><?xml version="1.0" encoding="utf-8"?>
+<p:sld xmlns:a="http://schemas.openxmlformats.org/drawingml/2006/main" xmlns:r="http://schemas.openxmlformats.org/officeDocument/2006/relationships" xmlns:p="http://schemas.openxmlformats.org/presentationml/2006/main">
+  <p:cSld>
+    <p:spTree>
+      <p:nvGrpSpPr>
+        <p:cNvPr id="1" name=""/>
+        <p:cNvGrpSpPr/>
+        <p:nvPr/>
+      </p:nvGrpSpPr>
+      <p:grpSpPr>
+        <a:xfrm>
+          <a:off x="0" y="0"/>
+          <a:ext cx="0" cy="0"/>
+          <a:chOff x="0" y="0"/>
+          <a:chExt cx="0" cy="0"/>
+        </a:xfrm>
+      </p:grpSpPr>
+      <p:sp>
+        <p:nvSpPr>
+          <p:cNvPr id="2" name="Title 1">
+            <a:extLst>
+              <a:ext uri="{FF2B5EF4-FFF2-40B4-BE49-F238E27FC236}">
+                <a16:creationId xmlns:a16="http://schemas.microsoft.com/office/drawing/2014/main" id="{619800FC-85CB-4A3C-9E1E-02923807BDEE}"/>
+              </a:ext>
+            </a:extLst>
+          </p:cNvPr>
+          <p:cNvSpPr>
+            <a:spLocks noGrp="1"/>
+          </p:cNvSpPr>
+          <p:nvPr>
+            <p:ph type="title"/>
+          </p:nvPr>
+        </p:nvSpPr>
+        <p:spPr/>
+        <p:txBody>
+          <a:bodyPr/>
+          <a:lstStyle/>
+          <a:p>
+            <a:endParaRPr lang="en-IN"/>
+          </a:p>
+        </p:txBody>
+      </p:sp>
+      <p:pic>
+        <p:nvPicPr>
+          <p:cNvPr id="11" name="Content Placeholder 10">
+            <a:extLst>
+              <a:ext uri="{FF2B5EF4-FFF2-40B4-BE49-F238E27FC236}">
+                <a16:creationId xmlns:a16="http://schemas.microsoft.com/office/drawing/2014/main" id="{62B99D17-7E99-499A-9FD6-D310B2B63DB3}"/>
+              </a:ext>
+            </a:extLst>
+          </p:cNvPr>
+          <p:cNvPicPr>
+            <a:picLocks noGrp="1" noChangeAspect="1"/>
+          </p:cNvPicPr>
+          <p:nvPr>
+            <p:ph idx="1"/>
+          </p:nvPr>
+        </p:nvPicPr>
+        <p:blipFill>
+          <a:blip r:embed="rId2"/>
+          <a:stretch>
+            <a:fillRect/>
+          </a:stretch>
+        </p:blipFill>
+        <p:spPr>
+          <a:xfrm>
+            <a:off x="382381" y="238620"/>
+            <a:ext cx="11463096" cy="6370794"/>
+          </a:xfrm>
+        </p:spPr>
+      </p:pic>
+      <p:pic>
+        <p:nvPicPr>
+          <p:cNvPr id="12" name="Picture 11">
+            <a:extLst>
+              <a:ext uri="{FF2B5EF4-FFF2-40B4-BE49-F238E27FC236}">
+                <a16:creationId xmlns:a16="http://schemas.microsoft.com/office/drawing/2014/main" id="{A4E7A5B3-D09A-420D-995A-759D6E601FC2}"/>
+              </a:ext>
+            </a:extLst>
+          </p:cNvPr>
+          <p:cNvPicPr>
+            <a:picLocks noChangeAspect="1"/>
+          </p:cNvPicPr>
+          <p:nvPr/>
+        </p:nvPicPr>
+        <p:blipFill>
+          <a:blip r:embed="rId3"/>
+          <a:stretch>
+            <a:fillRect/>
+          </a:stretch>
+        </p:blipFill>
+        <p:spPr>
+          <a:xfrm>
+            <a:off x="6304709" y="3279032"/>
+            <a:ext cx="1060652" cy="343757"/>
+          </a:xfrm>
+          <a:prstGeom prst="rect">
+            <a:avLst/>
+          </a:prstGeom>
+        </p:spPr>
+      </p:pic>
+      <p:sp>
+        <p:nvSpPr>
+          <p:cNvPr id="14" name="TextBox 13">
+            <a:extLst>
+              <a:ext uri="{FF2B5EF4-FFF2-40B4-BE49-F238E27FC236}">
+                <a16:creationId xmlns:a16="http://schemas.microsoft.com/office/drawing/2014/main" id="{C1D897DA-DC7E-4F46-85A7-99E2461C20E2}"/>
+              </a:ext>
+            </a:extLst>
+          </p:cNvPr>
+          <p:cNvSpPr txBox="1"/>
+          <p:nvPr/>
+        </p:nvSpPr>
+        <p:spPr>
+          <a:xfrm>
+            <a:off x="6835035" y="1632527"/>
+            <a:ext cx="6096000" cy="369332"/>
+          </a:xfrm>
+          <a:prstGeom prst="rect">
+            <a:avLst/>
+          </a:prstGeom>
+          <a:noFill/>
+        </p:spPr>
+        <p:txBody>
+          <a:bodyPr wrap="square">
+            <a:spAutoFit/>
+          </a:bodyPr>
+          <a:lstStyle/>
+          <a:p>
+            <a:r>
+              <a:rPr lang="en-IN" b="1" dirty="0">
+                <a:solidFill>
+                  <a:srgbClr val="FF0000"/>
+                </a:solidFill>
+              </a:rPr>
+              <a:t>&gt;1 selection</a:t>
+            </a:r>
+          </a:p>
+        </p:txBody>
+      </p:sp>
+      <p:sp>
+        <p:nvSpPr>
+          <p:cNvPr id="16" name="TextBox 15">
+            <a:extLst>
+              <a:ext uri="{FF2B5EF4-FFF2-40B4-BE49-F238E27FC236}">
+                <a16:creationId xmlns:a16="http://schemas.microsoft.com/office/drawing/2014/main" id="{31BF5939-CD6A-4D30-8364-9AEF9A320DAE}"/>
+              </a:ext>
+            </a:extLst>
+          </p:cNvPr>
+          <p:cNvSpPr txBox="1"/>
+          <p:nvPr/>
+        </p:nvSpPr>
+        <p:spPr>
+          <a:xfrm>
+            <a:off x="8859540" y="1632527"/>
+            <a:ext cx="2233333" cy="369332"/>
+          </a:xfrm>
+          <a:prstGeom prst="rect">
+            <a:avLst/>
+          </a:prstGeom>
+          <a:noFill/>
+        </p:spPr>
+        <p:txBody>
+          <a:bodyPr wrap="square">
+            <a:spAutoFit/>
+          </a:bodyPr>
+          <a:lstStyle/>
+          <a:p>
+            <a:r>
+              <a:rPr lang="en-IN" b="1" dirty="0">
+                <a:solidFill>
+                  <a:srgbClr val="FF0000"/>
+                </a:solidFill>
+              </a:rPr>
+              <a:t>Only 1 time selection</a:t>
+            </a:r>
+          </a:p>
+        </p:txBody>
+      </p:sp>
+    </p:spTree>
+    <p:extLst>
+      <p:ext uri="{BB962C8B-B14F-4D97-AF65-F5344CB8AC3E}">
+        <p14:creationId xmlns:p14="http://schemas.microsoft.com/office/powerpoint/2010/main" val="1023820969"/>
+      </p:ext>
+    </p:extLst>
+  </p:cSld>
+  <p:clrMapOvr>
+    <a:masterClrMapping/>
+  </p:clrMapOvr>
+</p:sld>
+</file>
+
+<file path=ppt/slides/slide8.xml><?xml version="1.0" encoding="utf-8"?>
+<p:sld xmlns:a="http://schemas.openxmlformats.org/drawingml/2006/main" xmlns:r="http://schemas.openxmlformats.org/officeDocument/2006/relationships" xmlns:p="http://schemas.openxmlformats.org/presentationml/2006/main">
+  <p:cSld>
+    <p:spTree>
+      <p:nvGrpSpPr>
+        <p:cNvPr id="1" name=""/>
+        <p:cNvGrpSpPr/>
+        <p:nvPr/>
+      </p:nvGrpSpPr>
+      <p:grpSpPr>
+        <a:xfrm>
+          <a:off x="0" y="0"/>
+          <a:ext cx="0" cy="0"/>
+          <a:chOff x="0" y="0"/>
+          <a:chExt cx="0" cy="0"/>
+        </a:xfrm>
+      </p:grpSpPr>
+      <p:pic>
+        <p:nvPicPr>
+          <p:cNvPr id="5" name="Content Placeholder 4">
+            <a:extLst>
+              <a:ext uri="{FF2B5EF4-FFF2-40B4-BE49-F238E27FC236}">
+                <a16:creationId xmlns:a16="http://schemas.microsoft.com/office/drawing/2014/main" id="{BCB91E9E-E0D9-4CBE-82E6-9507345BCE3A}"/>
+              </a:ext>
+            </a:extLst>
+          </p:cNvPr>
+          <p:cNvPicPr>
+            <a:picLocks noGrp="1" noChangeAspect="1"/>
+          </p:cNvPicPr>
+          <p:nvPr>
+            <p:ph idx="1"/>
+          </p:nvPr>
+        </p:nvPicPr>
+        <p:blipFill>
+          <a:blip r:embed="rId2"/>
+          <a:stretch>
+            <a:fillRect/>
+          </a:stretch>
+        </p:blipFill>
+        <p:spPr>
+          <a:xfrm>
+            <a:off x="2495444" y="211976"/>
+            <a:ext cx="6537724" cy="4351338"/>
+          </a:xfrm>
+        </p:spPr>
+      </p:pic>
+      <p:pic>
+        <p:nvPicPr>
+          <p:cNvPr id="7" name="Picture 6">
+            <a:extLst>
+              <a:ext uri="{FF2B5EF4-FFF2-40B4-BE49-F238E27FC236}">
+                <a16:creationId xmlns:a16="http://schemas.microsoft.com/office/drawing/2014/main" id="{4EDFDD62-BA81-4C7A-89B2-99E86788653C}"/>
+              </a:ext>
+            </a:extLst>
+          </p:cNvPr>
+          <p:cNvPicPr>
+            <a:picLocks noChangeAspect="1"/>
+          </p:cNvPicPr>
+          <p:nvPr/>
+        </p:nvPicPr>
+        <p:blipFill>
+          <a:blip r:embed="rId3"/>
+          <a:stretch>
+            <a:fillRect/>
+          </a:stretch>
+        </p:blipFill>
+        <p:spPr>
+          <a:xfrm>
+            <a:off x="2495444" y="4563314"/>
+            <a:ext cx="6537724" cy="2126857"/>
+          </a:xfrm>
+          <a:prstGeom prst="rect">
+            <a:avLst/>
+          </a:prstGeom>
+        </p:spPr>
+      </p:pic>
+    </p:spTree>
+    <p:extLst>
+      <p:ext uri="{BB962C8B-B14F-4D97-AF65-F5344CB8AC3E}">
+        <p14:creationId xmlns:p14="http://schemas.microsoft.com/office/powerpoint/2010/main" val="4232970794"/>
+      </p:ext>
+    </p:extLst>
+  </p:cSld>
+  <p:clrMapOvr>
+    <a:masterClrMapping/>
+  </p:clrMapOvr>
+</p:sld>
+</file>
+
+<file path=ppt/slides/slide9.xml><?xml version="1.0" encoding="utf-8"?>
+<p:sld xmlns:a="http://schemas.openxmlformats.org/drawingml/2006/main" xmlns:r="http://schemas.openxmlformats.org/officeDocument/2006/relationships" xmlns:p="http://schemas.openxmlformats.org/presentationml/2006/main">
+  <p:cSld>
+    <p:spTree>
+      <p:nvGrpSpPr>
+        <p:cNvPr id="1" name=""/>
+        <p:cNvGrpSpPr/>
+        <p:nvPr/>
+      </p:nvGrpSpPr>
+      <p:grpSpPr>
+        <a:xfrm>
+          <a:off x="0" y="0"/>
+          <a:ext cx="0" cy="0"/>
+          <a:chOff x="0" y="0"/>
+          <a:chExt cx="0" cy="0"/>
+        </a:xfrm>
+      </p:grpSpPr>
+      <p:sp>
+        <p:nvSpPr>
+          <p:cNvPr id="2" name="Title 1">
+            <a:extLst>
+              <a:ext uri="{FF2B5EF4-FFF2-40B4-BE49-F238E27FC236}">
+                <a16:creationId xmlns:a16="http://schemas.microsoft.com/office/drawing/2014/main" id="{1F02746F-46DB-4387-AE7E-24779C649E31}"/>
+              </a:ext>
+            </a:extLst>
+          </p:cNvPr>
+          <p:cNvSpPr>
+            <a:spLocks noGrp="1"/>
+          </p:cNvSpPr>
+          <p:nvPr>
+            <p:ph type="title"/>
+          </p:nvPr>
+        </p:nvSpPr>
+        <p:spPr/>
+        <p:txBody>
+          <a:bodyPr/>
+          <a:lstStyle/>
+          <a:p>
+            <a:r>
+              <a:rPr lang="en-IN" dirty="0"/>
+              <a:t>Unordered + with Repetitions</a:t>
+            </a:r>
+          </a:p>
+        </p:txBody>
+      </p:sp>
+      <p:sp>
+        <p:nvSpPr>
+          <p:cNvPr id="7" name="Content Placeholder 6">
+            <a:extLst>
+              <a:ext uri="{FF2B5EF4-FFF2-40B4-BE49-F238E27FC236}">
+                <a16:creationId xmlns:a16="http://schemas.microsoft.com/office/drawing/2014/main" id="{E3734FA3-33E3-4108-BF33-8FC85A6036CE}"/>
+              </a:ext>
+            </a:extLst>
+          </p:cNvPr>
+          <p:cNvSpPr>
+            <a:spLocks noGrp="1"/>
+          </p:cNvSpPr>
+          <p:nvPr>
+            <p:ph idx="1"/>
+          </p:nvPr>
+        </p:nvSpPr>
+        <p:spPr/>
+        <p:txBody>
+          <a:bodyPr/>
+          <a:lstStyle/>
+          <a:p>
+            <a:endParaRPr lang="en-IN" dirty="0"/>
+          </a:p>
+          <a:p>
+            <a:endParaRPr lang="en-IN" dirty="0"/>
+          </a:p>
+          <a:p>
+            <a:endParaRPr lang="en-IN" dirty="0"/>
+          </a:p>
+          <a:p>
+            <a:endParaRPr lang="en-IN" dirty="0"/>
+          </a:p>
+          <a:p>
+            <a:pPr marL="0" indent="0">
+              <a:buNone/>
+            </a:pPr>
+            <a:endParaRPr lang="en-IN" dirty="0"/>
+          </a:p>
+          <a:p>
+            <a:pPr marL="0" indent="0">
+              <a:buNone/>
+            </a:pPr>
+            <a:r>
+              <a:rPr lang="en-IN" dirty="0"/>
+              <a:t>Answer         *|**|*     =&gt; 15           </a:t>
+            </a:r>
+          </a:p>
+        </p:txBody>
+      </p:sp>
+      <p:pic>
+        <p:nvPicPr>
+          <p:cNvPr id="9" name="Picture 8">
+            <a:extLst>
+              <a:ext uri="{FF2B5EF4-FFF2-40B4-BE49-F238E27FC236}">
+                <a16:creationId xmlns:a16="http://schemas.microsoft.com/office/drawing/2014/main" id="{12B93DCE-2AC0-4DF3-A412-87D33516A0D3}"/>
+              </a:ext>
+            </a:extLst>
+          </p:cNvPr>
+          <p:cNvPicPr>
+            <a:picLocks noChangeAspect="1"/>
+          </p:cNvPicPr>
+          <p:nvPr/>
+        </p:nvPicPr>
+        <p:blipFill>
+          <a:blip r:embed="rId2"/>
+          <a:stretch>
+            <a:fillRect/>
+          </a:stretch>
+        </p:blipFill>
+        <p:spPr>
+          <a:xfrm>
+            <a:off x="838200" y="1385888"/>
+            <a:ext cx="8856305" cy="2700093"/>
+          </a:xfrm>
+          <a:prstGeom prst="rect">
+            <a:avLst/>
+          </a:prstGeom>
+        </p:spPr>
+      </p:pic>
+    </p:spTree>
+    <p:extLst>
+      <p:ext uri="{BB962C8B-B14F-4D97-AF65-F5344CB8AC3E}">
+        <p14:creationId xmlns:p14="http://schemas.microsoft.com/office/powerpoint/2010/main" val="880570768"/>
       </p:ext>
     </p:extLst>
   </p:cSld>

</xml_diff>